<commit_message>
Corrigindo detalhes na pagina projeto e categoria das disciplinas
</commit_message>
<xml_diff>
--- a/assets/img/mapa mental pesquisas.pptx
+++ b/assets/img/mapa mental pesquisas.pptx
@@ -104,6 +104,11 @@
       </a:defRPr>
     </a:lvl9pPr>
   </p:defaultTextStyle>
+  <p:extLst>
+    <p:ext uri="{EFAFB233-063F-42B5-8137-9DF3F51BA10A}">
+      <p15:sldGuideLst xmlns:p15="http://schemas.microsoft.com/office/powerpoint/2012/main"/>
+    </p:ext>
+  </p:extLst>
 </p:presentation>
 </file>
 
@@ -4417,7 +4422,7 @@
                 </a:solidFill>
                 <a:effectLst/>
               </a:rPr>
-              <a:t>(Coorientação Mestrado João Andrade PPGEC/POLI/UPE – orientação prof. Bruno Fernandes))</a:t>
+              <a:t>(Coorientação Mestrado João Andrade PPGEC/POLI/UPE – orientação prof. Bruno Fernandes)</a:t>
             </a:r>
             <a:endParaRPr lang="pt-BR" sz="1400" dirty="0">
               <a:solidFill>

</xml_diff>

<commit_message>
Deploying to gh-pages from @ ldhonorato/ldhonorato.github.io@d855a82c54c8f35a44d6ebdfcb717bf0163777c7 🚀
</commit_message>
<xml_diff>
--- a/assets/img/mapa mental pesquisas.pptx
+++ b/assets/img/mapa mental pesquisas.pptx
@@ -104,6 +104,11 @@
       </a:defRPr>
     </a:lvl9pPr>
   </p:defaultTextStyle>
+  <p:extLst>
+    <p:ext uri="{EFAFB233-063F-42B5-8137-9DF3F51BA10A}">
+      <p15:sldGuideLst xmlns:p15="http://schemas.microsoft.com/office/powerpoint/2012/main"/>
+    </p:ext>
+  </p:extLst>
 </p:presentation>
 </file>
 
@@ -4417,7 +4422,7 @@
                 </a:solidFill>
                 <a:effectLst/>
               </a:rPr>
-              <a:t>(Coorientação Mestrado João Andrade PPGEC/POLI/UPE – orientação prof. Bruno Fernandes))</a:t>
+              <a:t>(Coorientação Mestrado João Andrade PPGEC/POLI/UPE – orientação prof. Bruno Fernandes)</a:t>
             </a:r>
             <a:endParaRPr lang="pt-BR" sz="1400" dirty="0">
               <a:solidFill>

</xml_diff>